<commit_message>
Update screenshots and README
</commit_message>
<xml_diff>
--- a/Slides/csv2lines.pptx
+++ b/Slides/csv2lines.pptx
@@ -221,7 +221,7 @@
           <a:p>
             <a:fld id="{9410D272-305C-421E-A9EF-95D63D599B42}" type="datetimeFigureOut">
               <a:rPr lang="en-US" smtClean="0"/>
-              <a:t>4/2/2023</a:t>
+              <a:t>4/3/2023</a:t>
             </a:fld>
             <a:endParaRPr lang="en-US" dirty="0"/>
           </a:p>
@@ -398,7 +398,7 @@
           <a:p>
             <a:fld id="{05E16E63-7886-43BC-8DD4-4F14C3DD7360}" type="datetimeFigureOut">
               <a:rPr lang="en-US" smtClean="0"/>
-              <a:t>4/2/2023</a:t>
+              <a:t>4/3/2023</a:t>
             </a:fld>
             <a:endParaRPr lang="en-US" dirty="0"/>
           </a:p>
@@ -6691,7 +6691,7 @@
         </p:nvSpPr>
         <p:spPr>
           <a:xfrm>
-            <a:off x="5143661" y="3244906"/>
+            <a:off x="5186688" y="3277410"/>
             <a:ext cx="866274" cy="667753"/>
           </a:xfrm>
           <a:prstGeom prst="rightArrow">
@@ -6756,10 +6756,10 @@
       </p:pic>
       <p:pic>
         <p:nvPicPr>
-          <p:cNvPr id="29" name="Picture 28" descr="Graphical user interface&#10;&#10;Description automatically generated">
-            <a:extLst>
-              <a:ext uri="{FF2B5EF4-FFF2-40B4-BE49-F238E27FC236}">
-                <a16:creationId xmlns:a16="http://schemas.microsoft.com/office/drawing/2014/main" id="{73673754-2DA4-E388-4CE2-9FC19FEDBFA0}"/>
+          <p:cNvPr id="30" name="Picture 29" descr="A picture containing text, window&#10;&#10;Description automatically generated">
+            <a:extLst>
+              <a:ext uri="{FF2B5EF4-FFF2-40B4-BE49-F238E27FC236}">
+                <a16:creationId xmlns:a16="http://schemas.microsoft.com/office/drawing/2014/main" id="{457C3337-CC7D-3B46-9120-9DC126C44F65}"/>
               </a:ext>
             </a:extLst>
           </p:cNvPr>
@@ -6768,15 +6768,16 @@
           </p:cNvPicPr>
           <p:nvPr/>
         </p:nvPicPr>
-        <p:blipFill rotWithShape="1">
+        <p:blipFill>
           <a:blip r:embed="rId7"/>
-          <a:srcRect t="4598" r="25138" b="16409"/>
-          <a:stretch/>
+          <a:stretch>
+            <a:fillRect/>
+          </a:stretch>
         </p:blipFill>
         <p:spPr>
           <a:xfrm>
-            <a:off x="6130919" y="2090128"/>
-            <a:ext cx="5771944" cy="3425884"/>
+            <a:off x="312011" y="2575476"/>
+            <a:ext cx="4703348" cy="2215677"/>
           </a:xfrm>
           <a:prstGeom prst="round2DiagRect">
             <a:avLst>
@@ -6801,10 +6802,10 @@
       </p:pic>
       <p:pic>
         <p:nvPicPr>
-          <p:cNvPr id="30" name="Picture 29" descr="A picture containing text, window&#10;&#10;Description automatically generated">
-            <a:extLst>
-              <a:ext uri="{FF2B5EF4-FFF2-40B4-BE49-F238E27FC236}">
-                <a16:creationId xmlns:a16="http://schemas.microsoft.com/office/drawing/2014/main" id="{457C3337-CC7D-3B46-9120-9DC126C44F65}"/>
+          <p:cNvPr id="4" name="Picture 3" descr="A screenshot of a computer&#10;&#10;Description automatically generated with medium confidence">
+            <a:extLst>
+              <a:ext uri="{FF2B5EF4-FFF2-40B4-BE49-F238E27FC236}">
+                <a16:creationId xmlns:a16="http://schemas.microsoft.com/office/drawing/2014/main" id="{C290B4E9-977F-802F-80D1-D8DE1243AA7F}"/>
               </a:ext>
             </a:extLst>
           </p:cNvPr>
@@ -6813,16 +6814,15 @@
           </p:cNvPicPr>
           <p:nvPr/>
         </p:nvPicPr>
-        <p:blipFill>
+        <p:blipFill rotWithShape="1">
           <a:blip r:embed="rId8"/>
-          <a:stretch>
-            <a:fillRect/>
-          </a:stretch>
+          <a:srcRect t="7843" r="19191" b="16993"/>
+          <a:stretch/>
         </p:blipFill>
         <p:spPr>
           <a:xfrm>
-            <a:off x="189205" y="2548581"/>
-            <a:ext cx="4703348" cy="2215677"/>
+            <a:off x="6182064" y="2122098"/>
+            <a:ext cx="5692589" cy="2978379"/>
           </a:xfrm>
           <a:prstGeom prst="round2DiagRect">
             <a:avLst>
@@ -8997,10 +8997,10 @@
       </p:sp>
       <p:pic>
         <p:nvPicPr>
-          <p:cNvPr id="12" name="Picture 11" descr="Text&#10;&#10;Description automatically generated">
-            <a:extLst>
-              <a:ext uri="{FF2B5EF4-FFF2-40B4-BE49-F238E27FC236}">
-                <a16:creationId xmlns:a16="http://schemas.microsoft.com/office/drawing/2014/main" id="{A540207E-9F1F-9936-9429-0711D776CF13}"/>
+          <p:cNvPr id="14" name="Picture 13" descr="Text&#10;&#10;Description automatically generated">
+            <a:extLst>
+              <a:ext uri="{FF2B5EF4-FFF2-40B4-BE49-F238E27FC236}">
+                <a16:creationId xmlns:a16="http://schemas.microsoft.com/office/drawing/2014/main" id="{A86D7248-E251-A7B6-E460-3A192521A936}"/>
               </a:ext>
             </a:extLst>
           </p:cNvPr>
@@ -9011,52 +9011,6 @@
         </p:nvPicPr>
         <p:blipFill>
           <a:blip r:embed="rId6"/>
-          <a:stretch>
-            <a:fillRect/>
-          </a:stretch>
-        </p:blipFill>
-        <p:spPr>
-          <a:xfrm>
-            <a:off x="8130268" y="2816542"/>
-            <a:ext cx="2042432" cy="3510915"/>
-          </a:xfrm>
-          <a:prstGeom prst="round2DiagRect">
-            <a:avLst>
-              <a:gd name="adj1" fmla="val 16667"/>
-              <a:gd name="adj2" fmla="val 0"/>
-            </a:avLst>
-          </a:prstGeom>
-          <a:ln w="88900" cap="sq">
-            <a:solidFill>
-              <a:srgbClr val="FFFFFF"/>
-            </a:solidFill>
-            <a:miter lim="800000"/>
-          </a:ln>
-          <a:effectLst>
-            <a:outerShdw blurRad="254000" algn="tl" rotWithShape="0">
-              <a:srgbClr val="000000">
-                <a:alpha val="43000"/>
-              </a:srgbClr>
-            </a:outerShdw>
-          </a:effectLst>
-        </p:spPr>
-      </p:pic>
-      <p:pic>
-        <p:nvPicPr>
-          <p:cNvPr id="14" name="Picture 13" descr="Text&#10;&#10;Description automatically generated">
-            <a:extLst>
-              <a:ext uri="{FF2B5EF4-FFF2-40B4-BE49-F238E27FC236}">
-                <a16:creationId xmlns:a16="http://schemas.microsoft.com/office/drawing/2014/main" id="{A86D7248-E251-A7B6-E460-3A192521A936}"/>
-              </a:ext>
-            </a:extLst>
-          </p:cNvPr>
-          <p:cNvPicPr>
-            <a:picLocks noChangeAspect="1"/>
-          </p:cNvPicPr>
-          <p:nvPr/>
-        </p:nvPicPr>
-        <p:blipFill>
-          <a:blip r:embed="rId7"/>
           <a:stretch>
             <a:fillRect/>
           </a:stretch>
@@ -9116,6 +9070,52 @@
           <p:nvPr/>
         </p:nvPicPr>
         <p:blipFill>
+          <a:blip r:embed="rId7"/>
+          <a:stretch>
+            <a:fillRect/>
+          </a:stretch>
+        </p:blipFill>
+        <p:spPr>
+          <a:xfrm>
+            <a:off x="1243421" y="3277078"/>
+            <a:ext cx="6244046" cy="2941477"/>
+          </a:xfrm>
+          <a:prstGeom prst="round2DiagRect">
+            <a:avLst>
+              <a:gd name="adj1" fmla="val 16667"/>
+              <a:gd name="adj2" fmla="val 0"/>
+            </a:avLst>
+          </a:prstGeom>
+          <a:ln w="88900" cap="sq">
+            <a:solidFill>
+              <a:srgbClr val="FFFFFF"/>
+            </a:solidFill>
+            <a:miter lim="800000"/>
+          </a:ln>
+          <a:effectLst>
+            <a:outerShdw blurRad="254000" algn="tl" rotWithShape="0">
+              <a:srgbClr val="000000">
+                <a:alpha val="43000"/>
+              </a:srgbClr>
+            </a:outerShdw>
+          </a:effectLst>
+        </p:spPr>
+      </p:pic>
+      <p:pic>
+        <p:nvPicPr>
+          <p:cNvPr id="6" name="Picture 5" descr="A screenshot of a computer&#10;&#10;Description automatically generated with medium confidence">
+            <a:extLst>
+              <a:ext uri="{FF2B5EF4-FFF2-40B4-BE49-F238E27FC236}">
+                <a16:creationId xmlns:a16="http://schemas.microsoft.com/office/drawing/2014/main" id="{ADB22814-D928-9241-D3DD-CC80E2C9A2EE}"/>
+              </a:ext>
+            </a:extLst>
+          </p:cNvPr>
+          <p:cNvPicPr>
+            <a:picLocks noChangeAspect="1"/>
+          </p:cNvPicPr>
+          <p:nvPr/>
+        </p:nvPicPr>
+        <p:blipFill>
           <a:blip r:embed="rId8"/>
           <a:stretch>
             <a:fillRect/>
@@ -9123,8 +9123,8 @@
         </p:blipFill>
         <p:spPr>
           <a:xfrm>
-            <a:off x="1243421" y="3277078"/>
-            <a:ext cx="6244046" cy="2941477"/>
+            <a:off x="8165374" y="1081077"/>
+            <a:ext cx="3301187" cy="5369859"/>
           </a:xfrm>
           <a:prstGeom prst="round2DiagRect">
             <a:avLst>
@@ -11807,6 +11807,15 @@
 </file>
 
 <file path=customXml/item1.xml><?xml version="1.0" encoding="utf-8"?>
+<?mso-contentType ?>
+<FormTemplates xmlns="http://schemas.microsoft.com/sharepoint/v3/contenttype/forms">
+  <Display>DocumentLibraryForm</Display>
+  <Edit>DocumentLibraryForm</Edit>
+  <New>DocumentLibraryForm</New>
+</FormTemplates>
+</file>
+
+<file path=customXml/item2.xml><?xml version="1.0" encoding="utf-8"?>
 <p:properties xmlns:p="http://schemas.microsoft.com/office/2006/metadata/properties" xmlns:xsi="http://www.w3.org/2001/XMLSchema-instance" xmlns:pc="http://schemas.microsoft.com/office/infopath/2007/PartnerControls">
   <documentManagement>
     <Status xmlns="71af3243-3dd4-4a8d-8c0d-dd76da1f02a5">Not started</Status>
@@ -11823,15 +11832,6 @@
     <MediaServiceKeyPoints xmlns="71af3243-3dd4-4a8d-8c0d-dd76da1f02a5" xsi:nil="true"/>
   </documentManagement>
 </p:properties>
-</file>
-
-<file path=customXml/item2.xml><?xml version="1.0" encoding="utf-8"?>
-<?mso-contentType ?>
-<FormTemplates xmlns="http://schemas.microsoft.com/sharepoint/v3/contenttype/forms">
-  <Display>DocumentLibraryForm</Display>
-  <Edit>DocumentLibraryForm</Edit>
-  <New>DocumentLibraryForm</New>
-</FormTemplates>
 </file>
 
 <file path=customXml/item3.xml><?xml version="1.0" encoding="utf-8"?>
@@ -12111,6 +12111,14 @@
 </file>
 
 <file path=customXml/itemProps1.xml><?xml version="1.0" encoding="utf-8"?>
+<ds:datastoreItem xmlns:ds="http://schemas.openxmlformats.org/officeDocument/2006/customXml" ds:itemID="{A5CCB28C-7D26-4A36-9CFC-D739C28F3D18}">
+  <ds:schemaRefs>
+    <ds:schemaRef ds:uri="http://schemas.microsoft.com/sharepoint/v3/contenttype/forms"/>
+  </ds:schemaRefs>
+</ds:datastoreItem>
+</file>
+
+<file path=customXml/itemProps2.xml><?xml version="1.0" encoding="utf-8"?>
 <ds:datastoreItem xmlns:ds="http://schemas.openxmlformats.org/officeDocument/2006/customXml" ds:itemID="{08757C30-AE9A-4680-90EB-19D282EC2B7C}">
   <ds:schemaRefs>
     <ds:schemaRef ds:uri="http://schemas.microsoft.com/office/2006/metadata/properties"/>
@@ -12118,14 +12126,6 @@
     <ds:schemaRef ds:uri="71af3243-3dd4-4a8d-8c0d-dd76da1f02a5"/>
     <ds:schemaRef ds:uri="http://schemas.microsoft.com/sharepoint/v3"/>
     <ds:schemaRef ds:uri="230e9df3-be65-4c73-a93b-d1236ebd677e"/>
-  </ds:schemaRefs>
-</ds:datastoreItem>
-</file>
-
-<file path=customXml/itemProps2.xml><?xml version="1.0" encoding="utf-8"?>
-<ds:datastoreItem xmlns:ds="http://schemas.openxmlformats.org/officeDocument/2006/customXml" ds:itemID="{A5CCB28C-7D26-4A36-9CFC-D739C28F3D18}">
-  <ds:schemaRefs>
-    <ds:schemaRef ds:uri="http://schemas.microsoft.com/sharepoint/v3/contenttype/forms"/>
   </ds:schemaRefs>
 </ds:datastoreItem>
 </file>

</xml_diff>